<commit_message>
add experimental product and analytical preparation subclasses of 'produced in lab'
some other additional scope notes in diagram as well.
</commit_message>
<xml_diff>
--- a/vocabulary/SpecimentTypeDecisionTree.pptx
+++ b/vocabulary/SpecimentTypeDecisionTree.pptx
@@ -243,7 +243,7 @@
           <a:p>
             <a:fld id="{1956BE6B-EBDA-47AD-B12E-4D406315FF98}" type="datetimeFigureOut">
               <a:rPr lang="en-US" smtClean="0"/>
-              <a:t>4/20/2021</a:t>
+              <a:t>6/3/2021</a:t>
             </a:fld>
             <a:endParaRPr lang="en-US"/>
           </a:p>
@@ -413,7 +413,7 @@
           <a:p>
             <a:fld id="{1956BE6B-EBDA-47AD-B12E-4D406315FF98}" type="datetimeFigureOut">
               <a:rPr lang="en-US" smtClean="0"/>
-              <a:t>4/20/2021</a:t>
+              <a:t>6/3/2021</a:t>
             </a:fld>
             <a:endParaRPr lang="en-US"/>
           </a:p>
@@ -593,7 +593,7 @@
           <a:p>
             <a:fld id="{1956BE6B-EBDA-47AD-B12E-4D406315FF98}" type="datetimeFigureOut">
               <a:rPr lang="en-US" smtClean="0"/>
-              <a:t>4/20/2021</a:t>
+              <a:t>6/3/2021</a:t>
             </a:fld>
             <a:endParaRPr lang="en-US"/>
           </a:p>
@@ -763,7 +763,7 @@
           <a:p>
             <a:fld id="{1956BE6B-EBDA-47AD-B12E-4D406315FF98}" type="datetimeFigureOut">
               <a:rPr lang="en-US" smtClean="0"/>
-              <a:t>4/20/2021</a:t>
+              <a:t>6/3/2021</a:t>
             </a:fld>
             <a:endParaRPr lang="en-US"/>
           </a:p>
@@ -1007,7 +1007,7 @@
           <a:p>
             <a:fld id="{1956BE6B-EBDA-47AD-B12E-4D406315FF98}" type="datetimeFigureOut">
               <a:rPr lang="en-US" smtClean="0"/>
-              <a:t>4/20/2021</a:t>
+              <a:t>6/3/2021</a:t>
             </a:fld>
             <a:endParaRPr lang="en-US"/>
           </a:p>
@@ -1239,7 +1239,7 @@
           <a:p>
             <a:fld id="{1956BE6B-EBDA-47AD-B12E-4D406315FF98}" type="datetimeFigureOut">
               <a:rPr lang="en-US" smtClean="0"/>
-              <a:t>4/20/2021</a:t>
+              <a:t>6/3/2021</a:t>
             </a:fld>
             <a:endParaRPr lang="en-US"/>
           </a:p>
@@ -1606,7 +1606,7 @@
           <a:p>
             <a:fld id="{1956BE6B-EBDA-47AD-B12E-4D406315FF98}" type="datetimeFigureOut">
               <a:rPr lang="en-US" smtClean="0"/>
-              <a:t>4/20/2021</a:t>
+              <a:t>6/3/2021</a:t>
             </a:fld>
             <a:endParaRPr lang="en-US"/>
           </a:p>
@@ -1724,7 +1724,7 @@
           <a:p>
             <a:fld id="{1956BE6B-EBDA-47AD-B12E-4D406315FF98}" type="datetimeFigureOut">
               <a:rPr lang="en-US" smtClean="0"/>
-              <a:t>4/20/2021</a:t>
+              <a:t>6/3/2021</a:t>
             </a:fld>
             <a:endParaRPr lang="en-US"/>
           </a:p>
@@ -1819,7 +1819,7 @@
           <a:p>
             <a:fld id="{1956BE6B-EBDA-47AD-B12E-4D406315FF98}" type="datetimeFigureOut">
               <a:rPr lang="en-US" smtClean="0"/>
-              <a:t>4/20/2021</a:t>
+              <a:t>6/3/2021</a:t>
             </a:fld>
             <a:endParaRPr lang="en-US"/>
           </a:p>
@@ -2096,7 +2096,7 @@
           <a:p>
             <a:fld id="{1956BE6B-EBDA-47AD-B12E-4D406315FF98}" type="datetimeFigureOut">
               <a:rPr lang="en-US" smtClean="0"/>
-              <a:t>4/20/2021</a:t>
+              <a:t>6/3/2021</a:t>
             </a:fld>
             <a:endParaRPr lang="en-US"/>
           </a:p>
@@ -2353,7 +2353,7 @@
           <a:p>
             <a:fld id="{1956BE6B-EBDA-47AD-B12E-4D406315FF98}" type="datetimeFigureOut">
               <a:rPr lang="en-US" smtClean="0"/>
-              <a:t>4/20/2021</a:t>
+              <a:t>6/3/2021</a:t>
             </a:fld>
             <a:endParaRPr lang="en-US"/>
           </a:p>
@@ -2566,7 +2566,7 @@
           <a:p>
             <a:fld id="{1956BE6B-EBDA-47AD-B12E-4D406315FF98}" type="datetimeFigureOut">
               <a:rPr lang="en-US" smtClean="0"/>
-              <a:t>4/20/2021</a:t>
+              <a:t>6/3/2021</a:t>
             </a:fld>
             <a:endParaRPr lang="en-US"/>
           </a:p>
@@ -3044,7 +3044,7 @@
         </p:nvSpPr>
         <p:spPr>
           <a:xfrm>
-            <a:off x="7520195" y="1680299"/>
+            <a:off x="7175131" y="1341475"/>
             <a:ext cx="1465385" cy="655994"/>
           </a:xfrm>
           <a:prstGeom prst="rect">
@@ -3162,7 +3162,7 @@
         </p:nvSpPr>
         <p:spPr>
           <a:xfrm>
-            <a:off x="11916048" y="4555845"/>
+            <a:off x="12291871" y="4490292"/>
             <a:ext cx="2127259" cy="950988"/>
           </a:xfrm>
           <a:prstGeom prst="rect">
@@ -3652,7 +3652,7 @@
         <p:spPr>
           <a:xfrm>
             <a:off x="6481801" y="1536043"/>
-            <a:ext cx="1038394" cy="472253"/>
+            <a:ext cx="693330" cy="133429"/>
           </a:xfrm>
           <a:prstGeom prst="straightConnector1">
             <a:avLst/>
@@ -3837,7 +3837,7 @@
         </p:nvSpPr>
         <p:spPr>
           <a:xfrm>
-            <a:off x="9162982" y="6521398"/>
+            <a:off x="9791893" y="5861416"/>
             <a:ext cx="1518085" cy="646331"/>
           </a:xfrm>
           <a:prstGeom prst="rect">
@@ -3877,8 +3877,8 @@
         </p:nvCxnSpPr>
         <p:spPr>
           <a:xfrm flipH="1">
-            <a:off x="9922025" y="5049633"/>
-            <a:ext cx="1024286" cy="1471765"/>
+            <a:off x="10550936" y="5049633"/>
+            <a:ext cx="395375" cy="811783"/>
           </a:xfrm>
           <a:prstGeom prst="straightConnector1">
             <a:avLst/>
@@ -3925,8 +3925,8 @@
         </p:nvCxnSpPr>
         <p:spPr>
           <a:xfrm flipH="1">
-            <a:off x="7902541" y="4793438"/>
-            <a:ext cx="2400173" cy="1293493"/>
+            <a:off x="8429543" y="4793438"/>
+            <a:ext cx="1873171" cy="1345355"/>
           </a:xfrm>
           <a:prstGeom prst="straightConnector1">
             <a:avLst/>
@@ -3968,7 +3968,7 @@
         </p:nvSpPr>
         <p:spPr>
           <a:xfrm>
-            <a:off x="7451392" y="6086931"/>
+            <a:off x="7978394" y="6138793"/>
             <a:ext cx="902298" cy="369332"/>
           </a:xfrm>
           <a:prstGeom prst="rect">
@@ -4088,9 +4088,9 @@
           <p:nvPr/>
         </p:nvCxnSpPr>
         <p:spPr>
-          <a:xfrm flipH="1">
-            <a:off x="8120523" y="2336293"/>
-            <a:ext cx="132365" cy="569691"/>
+          <a:xfrm>
+            <a:off x="7907824" y="1997469"/>
+            <a:ext cx="119993" cy="347820"/>
           </a:xfrm>
           <a:prstGeom prst="straightConnector1">
             <a:avLst/>
@@ -4132,7 +4132,7 @@
         </p:nvSpPr>
         <p:spPr>
           <a:xfrm>
-            <a:off x="7485718" y="2905984"/>
+            <a:off x="7393012" y="2345289"/>
             <a:ext cx="1269610" cy="646331"/>
           </a:xfrm>
           <a:prstGeom prst="rect">
@@ -4593,12 +4593,12 @@
         </p:nvCxnSpPr>
         <p:spPr>
           <a:xfrm rot="10800000" flipV="1">
-            <a:off x="8572466" y="5031339"/>
-            <a:ext cx="3343582" cy="3497374"/>
+            <a:off x="8572467" y="4965785"/>
+            <a:ext cx="3719405" cy="3562927"/>
           </a:xfrm>
           <a:prstGeom prst="curvedConnector3">
             <a:avLst>
-              <a:gd name="adj1" fmla="val 8598"/>
+              <a:gd name="adj1" fmla="val 15124"/>
             </a:avLst>
           </a:prstGeom>
           <a:ln w="57150">
@@ -4785,9 +4785,9 @@
           <p:nvPr/>
         </p:nvCxnSpPr>
         <p:spPr>
-          <a:xfrm>
-            <a:off x="12979678" y="5506833"/>
-            <a:ext cx="264102" cy="653481"/>
+          <a:xfrm flipH="1">
+            <a:off x="13243780" y="5441280"/>
+            <a:ext cx="111721" cy="719034"/>
           </a:xfrm>
           <a:prstGeom prst="straightConnector1">
             <a:avLst/>
@@ -4870,7 +4870,7 @@
         <p:spPr>
           <a:xfrm>
             <a:off x="12732668" y="3781129"/>
-            <a:ext cx="247010" cy="774716"/>
+            <a:ext cx="622833" cy="709163"/>
           </a:xfrm>
           <a:prstGeom prst="straightConnector1">
             <a:avLst/>
@@ -5262,8 +5262,8 @@
         </p:nvSpPr>
         <p:spPr>
           <a:xfrm>
-            <a:off x="1888439" y="9188536"/>
-            <a:ext cx="2405388" cy="400110"/>
+            <a:off x="1961762" y="9210427"/>
+            <a:ext cx="2134831" cy="400110"/>
           </a:xfrm>
           <a:prstGeom prst="rect">
             <a:avLst/>
@@ -5298,7 +5298,7 @@
         <p:spPr>
           <a:xfrm>
             <a:off x="208937" y="7778533"/>
-            <a:ext cx="1619132" cy="553998"/>
+            <a:ext cx="1619132" cy="707886"/>
           </a:xfrm>
           <a:prstGeom prst="rect">
             <a:avLst/>
@@ -5313,7 +5313,7 @@
           <a:p>
             <a:r>
               <a:rPr lang="en-US" sz="1000" dirty="0"/>
-              <a:t>Tissue, chitin, teeth, claws, bone, horn (with organic tissue included)</a:t>
+              <a:t>Tissue, chitin, teeth, claws, bone, horn (with organic tissue included); Herbarium packet with plant parts.</a:t>
             </a:r>
           </a:p>
         </p:txBody>
@@ -5332,8 +5332,8 @@
         </p:nvSpPr>
         <p:spPr>
           <a:xfrm>
-            <a:off x="10558812" y="8892386"/>
-            <a:ext cx="2168208" cy="707886"/>
+            <a:off x="10586793" y="8850740"/>
+            <a:ext cx="2134831" cy="707886"/>
           </a:xfrm>
           <a:prstGeom prst="rect">
             <a:avLst/>
@@ -5402,8 +5402,8 @@
         </p:nvSpPr>
         <p:spPr>
           <a:xfrm>
-            <a:off x="6101977" y="6411095"/>
-            <a:ext cx="2894081" cy="707886"/>
+            <a:off x="7342542" y="6456601"/>
+            <a:ext cx="2243237" cy="1015663"/>
           </a:xfrm>
           <a:prstGeom prst="rect">
             <a:avLst/>
@@ -5437,8 +5437,8 @@
         </p:nvSpPr>
         <p:spPr>
           <a:xfrm>
-            <a:off x="8582654" y="7070647"/>
-            <a:ext cx="2745734" cy="707886"/>
+            <a:off x="9540519" y="6455361"/>
+            <a:ext cx="2092549" cy="861774"/>
           </a:xfrm>
           <a:prstGeom prst="rect">
             <a:avLst/>
@@ -5473,7 +5473,7 @@
         <p:spPr>
           <a:xfrm>
             <a:off x="12562691" y="7919767"/>
-            <a:ext cx="2039060" cy="707886"/>
+            <a:ext cx="2039060" cy="1015663"/>
           </a:xfrm>
           <a:prstGeom prst="rect">
             <a:avLst/>
@@ -5488,7 +5488,7 @@
           <a:p>
             <a:r>
               <a:rPr lang="en-US" sz="1000" dirty="0"/>
-              <a:t>Borehole cuttings, loose soil or sediment (e.g. in a bag), rock chips, particulate filtrate or precipitate; rock powders, synthetic powders</a:t>
+              <a:t>Borehole cuttings, loose soil or sediment (e.g. in a bag), rock chips, particulate filtrate or precipitate.  Rock powders (identified as a separate sample) would be ‘Analytical Preparation’</a:t>
             </a:r>
           </a:p>
         </p:txBody>
@@ -5508,7 +5508,7 @@
         <p:spPr>
           <a:xfrm>
             <a:off x="3004027" y="5799548"/>
-            <a:ext cx="2247709" cy="553998"/>
+            <a:ext cx="2247709" cy="707886"/>
           </a:xfrm>
           <a:prstGeom prst="rect">
             <a:avLst/>
@@ -5523,7 +5523,7 @@
           <a:p>
             <a:r>
               <a:rPr lang="en-US" sz="1000" dirty="0"/>
-              <a:t>E.g.: Leaf litter, soil, water, or sediment collected for biological analysis, ocean trawl for biome sample</a:t>
+              <a:t>E.g.: Leaf litter, soil, water, or sediment collected for biological analysis, ocean trawl for biome sample.  Cultures derived from a soil or water sample. </a:t>
             </a:r>
           </a:p>
         </p:txBody>
@@ -5542,8 +5542,8 @@
         </p:nvSpPr>
         <p:spPr>
           <a:xfrm>
-            <a:off x="3906239" y="3895730"/>
-            <a:ext cx="2247709" cy="553998"/>
+            <a:off x="3693614" y="3780930"/>
+            <a:ext cx="2050503" cy="707886"/>
           </a:xfrm>
           <a:prstGeom prst="rect">
             <a:avLst/>
@@ -5566,7 +5566,7 @@
             </a:r>
             <a:r>
               <a:rPr lang="en-US" sz="1000" dirty="0"/>
-              <a:t>, typically preserved in some fluid in a container….; pin-mounted insect. </a:t>
+              <a:t>, typically preserved in some fluid in a container….; pin-mounted insect; whole plant on herbarium sheet. </a:t>
             </a:r>
           </a:p>
         </p:txBody>
@@ -5585,7 +5585,7 @@
         </p:nvSpPr>
         <p:spPr>
           <a:xfrm>
-            <a:off x="9242805" y="1124922"/>
+            <a:off x="9393337" y="918638"/>
             <a:ext cx="2119819" cy="861774"/>
           </a:xfrm>
           <a:prstGeom prst="rect">
@@ -5628,7 +5628,7 @@
         </p:nvSpPr>
         <p:spPr>
           <a:xfrm>
-            <a:off x="4173523" y="279442"/>
+            <a:off x="3958384" y="88627"/>
             <a:ext cx="6070733" cy="523220"/>
           </a:xfrm>
           <a:prstGeom prst="rect">
@@ -5698,8 +5698,8 @@
         </p:nvSpPr>
         <p:spPr>
           <a:xfrm>
-            <a:off x="5685425" y="2217265"/>
-            <a:ext cx="1258021" cy="553998"/>
+            <a:off x="5718737" y="2067004"/>
+            <a:ext cx="1556162" cy="861774"/>
           </a:xfrm>
           <a:prstGeom prst="rect">
             <a:avLst/>
@@ -5714,7 +5714,7 @@
           <a:p>
             <a:r>
               <a:rPr lang="en-US" sz="1000" dirty="0"/>
-              <a:t>Note these will overlap with ‘piece of solid material’</a:t>
+              <a:t>Note these will overlap with ‘piece of solid material’ or Aggregation (if a collection of fossils from a single source)</a:t>
             </a:r>
           </a:p>
         </p:txBody>
@@ -5737,8 +5737,8 @@
         </p:nvCxnSpPr>
         <p:spPr>
           <a:xfrm>
-            <a:off x="8985580" y="2008296"/>
-            <a:ext cx="474470" cy="665239"/>
+            <a:off x="8640516" y="1669472"/>
+            <a:ext cx="1007805" cy="470926"/>
           </a:xfrm>
           <a:prstGeom prst="straightConnector1">
             <a:avLst/>
@@ -5781,8 +5781,8 @@
         </p:nvSpPr>
         <p:spPr>
           <a:xfrm>
-            <a:off x="9460050" y="2216335"/>
-            <a:ext cx="1803638" cy="914400"/>
+            <a:off x="9648321" y="1812297"/>
+            <a:ext cx="1635536" cy="656202"/>
           </a:xfrm>
           <a:prstGeom prst="rect">
             <a:avLst/>
@@ -5838,14 +5838,14 @@
           <p:cNvCxnSpPr>
             <a:cxnSpLocks/>
             <a:stCxn id="299" idx="3"/>
-            <a:endCxn id="4" idx="1"/>
+            <a:endCxn id="4" idx="0"/>
           </p:cNvCxnSpPr>
           <p:nvPr/>
         </p:nvCxnSpPr>
         <p:spPr>
           <a:xfrm>
-            <a:off x="11263688" y="2673535"/>
-            <a:ext cx="567161" cy="650394"/>
+            <a:off x="11283857" y="2140398"/>
+            <a:ext cx="1448811" cy="726331"/>
           </a:xfrm>
           <a:prstGeom prst="straightConnector1">
             <a:avLst/>
@@ -5886,14 +5886,13 @@
           <p:cNvCxnSpPr>
             <a:cxnSpLocks/>
             <a:stCxn id="299" idx="2"/>
-            <a:endCxn id="3" idx="0"/>
           </p:cNvCxnSpPr>
           <p:nvPr/>
         </p:nvCxnSpPr>
         <p:spPr>
           <a:xfrm flipH="1">
-            <a:off x="7858394" y="3130735"/>
-            <a:ext cx="2503475" cy="1071982"/>
+            <a:off x="8825411" y="2468499"/>
+            <a:ext cx="1640678" cy="724582"/>
           </a:xfrm>
           <a:prstGeom prst="straightConnector1">
             <a:avLst/>
@@ -5935,8 +5934,8 @@
         </p:nvSpPr>
         <p:spPr>
           <a:xfrm>
-            <a:off x="6747552" y="4591313"/>
-            <a:ext cx="2280252" cy="707886"/>
+            <a:off x="5969295" y="4901229"/>
+            <a:ext cx="1610328" cy="553998"/>
           </a:xfrm>
           <a:prstGeom prst="rect">
             <a:avLst/>
@@ -5951,15 +5950,7 @@
           <a:p>
             <a:r>
               <a:rPr lang="en-US" sz="1000" dirty="0"/>
-              <a:t>Specimen is product of an experimental procedure (e.g. synthetic material), or analytical preparation (e.g. thin section, </a:t>
-            </a:r>
-            <a:r>
-              <a:rPr lang="en-US" sz="1000" dirty="0" err="1"/>
-              <a:t>xrf</a:t>
-            </a:r>
-            <a:r>
-              <a:rPr lang="en-US" sz="1000" dirty="0"/>
-              <a:t> bead, SEM stub)</a:t>
+              <a:t>Specimen is product of an experimental procedure (e.g. synthetic material) </a:t>
             </a:r>
           </a:p>
         </p:txBody>
@@ -5978,8 +5969,8 @@
         </p:nvSpPr>
         <p:spPr>
           <a:xfrm>
-            <a:off x="6934839" y="4202717"/>
-            <a:ext cx="1847109" cy="369332"/>
+            <a:off x="6090788" y="4288374"/>
+            <a:ext cx="1287193" cy="646331"/>
           </a:xfrm>
           <a:prstGeom prst="rect">
             <a:avLst/>
@@ -5999,13 +5990,245 @@
             </a:lvl1pPr>
           </a:lstStyle>
           <a:p>
+            <a:pPr algn="ctr"/>
             <a:r>
               <a:rPr lang="en-US" dirty="0"/>
-              <a:t>Research product</a:t>
-            </a:r>
-          </a:p>
-        </p:txBody>
-      </p:sp>
+              <a:t>Experiment product</a:t>
+            </a:r>
+          </a:p>
+        </p:txBody>
+      </p:sp>
+      <p:sp>
+        <p:nvSpPr>
+          <p:cNvPr id="90" name="Rectangle 89">
+            <a:extLst>
+              <a:ext uri="{FF2B5EF4-FFF2-40B4-BE49-F238E27FC236}">
+                <a16:creationId xmlns:a16="http://schemas.microsoft.com/office/drawing/2014/main" id="{533BD0E3-56C6-4070-BB12-92A90AA7F351}"/>
+              </a:ext>
+            </a:extLst>
+          </p:cNvPr>
+          <p:cNvSpPr/>
+          <p:nvPr/>
+        </p:nvSpPr>
+        <p:spPr>
+          <a:xfrm>
+            <a:off x="7527446" y="3250317"/>
+            <a:ext cx="1635536" cy="656202"/>
+          </a:xfrm>
+          <a:prstGeom prst="rect">
+            <a:avLst/>
+          </a:prstGeom>
+          <a:solidFill>
+            <a:schemeClr val="accent3">
+              <a:lumMod val="40000"/>
+              <a:lumOff val="60000"/>
+            </a:schemeClr>
+          </a:solidFill>
+        </p:spPr>
+        <p:style>
+          <a:lnRef idx="2">
+            <a:schemeClr val="accent1">
+              <a:shade val="50000"/>
+            </a:schemeClr>
+          </a:lnRef>
+          <a:fillRef idx="1">
+            <a:schemeClr val="accent1"/>
+          </a:fillRef>
+          <a:effectRef idx="0">
+            <a:schemeClr val="accent1"/>
+          </a:effectRef>
+          <a:fontRef idx="minor">
+            <a:schemeClr val="lt1"/>
+          </a:fontRef>
+        </p:style>
+        <p:txBody>
+          <a:bodyPr rtlCol="0" anchor="ctr"/>
+          <a:lstStyle/>
+          <a:p>
+            <a:pPr algn="ctr"/>
+            <a:r>
+              <a:rPr lang="en-US" dirty="0">
+                <a:solidFill>
+                  <a:schemeClr val="tx1"/>
+                </a:solidFill>
+              </a:rPr>
+              <a:t>Experiment product?</a:t>
+            </a:r>
+          </a:p>
+        </p:txBody>
+      </p:sp>
+      <p:sp>
+        <p:nvSpPr>
+          <p:cNvPr id="32" name="TextBox 31">
+            <a:extLst>
+              <a:ext uri="{FF2B5EF4-FFF2-40B4-BE49-F238E27FC236}">
+                <a16:creationId xmlns:a16="http://schemas.microsoft.com/office/drawing/2014/main" id="{FEAD01F4-5B01-42DB-BF45-5B507AEDEB9A}"/>
+              </a:ext>
+            </a:extLst>
+          </p:cNvPr>
+          <p:cNvSpPr txBox="1"/>
+          <p:nvPr/>
+        </p:nvSpPr>
+        <p:spPr>
+          <a:xfrm>
+            <a:off x="7629808" y="4788658"/>
+            <a:ext cx="1606031" cy="861774"/>
+          </a:xfrm>
+          <a:prstGeom prst="rect">
+            <a:avLst/>
+          </a:prstGeom>
+          <a:noFill/>
+        </p:spPr>
+        <p:txBody>
+          <a:bodyPr wrap="square" rtlCol="0">
+            <a:spAutoFit/>
+          </a:bodyPr>
+          <a:lstStyle/>
+          <a:p>
+            <a:r>
+              <a:rPr lang="en-US" sz="1000" dirty="0"/>
+              <a:t>e.g. thin section, XRF bead, SEM stub, rock powder. If identified separately, this should have a ‘parent’ link to the original sample</a:t>
+            </a:r>
+          </a:p>
+        </p:txBody>
+      </p:sp>
+      <p:sp>
+        <p:nvSpPr>
+          <p:cNvPr id="33" name="TextBox 32">
+            <a:extLst>
+              <a:ext uri="{FF2B5EF4-FFF2-40B4-BE49-F238E27FC236}">
+                <a16:creationId xmlns:a16="http://schemas.microsoft.com/office/drawing/2014/main" id="{011B595C-2017-4E7E-960C-441AA9C364B6}"/>
+              </a:ext>
+            </a:extLst>
+          </p:cNvPr>
+          <p:cNvSpPr txBox="1"/>
+          <p:nvPr/>
+        </p:nvSpPr>
+        <p:spPr>
+          <a:xfrm>
+            <a:off x="7643354" y="4206796"/>
+            <a:ext cx="1490906" cy="646331"/>
+          </a:xfrm>
+          <a:prstGeom prst="rect">
+            <a:avLst/>
+          </a:prstGeom>
+          <a:noFill/>
+        </p:spPr>
+        <p:txBody>
+          <a:bodyPr wrap="square" rtlCol="0">
+            <a:spAutoFit/>
+          </a:bodyPr>
+          <a:lstStyle>
+            <a:defPPr>
+              <a:defRPr lang="en-US"/>
+            </a:defPPr>
+            <a:lvl1pPr algn="ctr">
+              <a:defRPr b="1"/>
+            </a:lvl1pPr>
+          </a:lstStyle>
+          <a:p>
+            <a:r>
+              <a:rPr lang="en-US" dirty="0"/>
+              <a:t>Analytical preparation</a:t>
+            </a:r>
+          </a:p>
+        </p:txBody>
+      </p:sp>
+      <p:cxnSp>
+        <p:nvCxnSpPr>
+          <p:cNvPr id="93" name="Straight Arrow Connector 92">
+            <a:extLst>
+              <a:ext uri="{FF2B5EF4-FFF2-40B4-BE49-F238E27FC236}">
+                <a16:creationId xmlns:a16="http://schemas.microsoft.com/office/drawing/2014/main" id="{A489A4FB-D02B-40DA-86B7-0834F96F37D6}"/>
+              </a:ext>
+            </a:extLst>
+          </p:cNvPr>
+          <p:cNvCxnSpPr>
+            <a:cxnSpLocks/>
+            <a:stCxn id="90" idx="1"/>
+            <a:endCxn id="3" idx="0"/>
+          </p:cNvCxnSpPr>
+          <p:nvPr/>
+        </p:nvCxnSpPr>
+        <p:spPr>
+          <a:xfrm flipH="1">
+            <a:off x="6734385" y="3578418"/>
+            <a:ext cx="793061" cy="709956"/>
+          </a:xfrm>
+          <a:prstGeom prst="straightConnector1">
+            <a:avLst/>
+          </a:prstGeom>
+          <a:ln w="57150">
+            <a:solidFill>
+              <a:srgbClr val="00B050"/>
+            </a:solidFill>
+            <a:headEnd type="none" w="med" len="med"/>
+            <a:tailEnd type="triangle" w="med" len="med"/>
+          </a:ln>
+        </p:spPr>
+        <p:style>
+          <a:lnRef idx="1">
+            <a:schemeClr val="accent1"/>
+          </a:lnRef>
+          <a:fillRef idx="0">
+            <a:schemeClr val="accent1"/>
+          </a:fillRef>
+          <a:effectRef idx="0">
+            <a:schemeClr val="accent1"/>
+          </a:effectRef>
+          <a:fontRef idx="minor">
+            <a:schemeClr val="tx1"/>
+          </a:fontRef>
+        </p:style>
+      </p:cxnSp>
+      <p:cxnSp>
+        <p:nvCxnSpPr>
+          <p:cNvPr id="95" name="Straight Arrow Connector 94">
+            <a:extLst>
+              <a:ext uri="{FF2B5EF4-FFF2-40B4-BE49-F238E27FC236}">
+                <a16:creationId xmlns:a16="http://schemas.microsoft.com/office/drawing/2014/main" id="{2AE6441D-7BF9-4081-9CE2-645562767ED9}"/>
+              </a:ext>
+            </a:extLst>
+          </p:cNvPr>
+          <p:cNvCxnSpPr>
+            <a:cxnSpLocks/>
+            <a:stCxn id="90" idx="2"/>
+            <a:endCxn id="33" idx="0"/>
+          </p:cNvCxnSpPr>
+          <p:nvPr/>
+        </p:nvCxnSpPr>
+        <p:spPr>
+          <a:xfrm>
+            <a:off x="8345214" y="3906519"/>
+            <a:ext cx="43593" cy="300277"/>
+          </a:xfrm>
+          <a:prstGeom prst="straightConnector1">
+            <a:avLst/>
+          </a:prstGeom>
+          <a:ln w="57150">
+            <a:solidFill>
+              <a:srgbClr val="FF0000"/>
+            </a:solidFill>
+            <a:prstDash val="sysDash"/>
+            <a:headEnd type="none" w="med" len="med"/>
+            <a:tailEnd type="triangle" w="med" len="med"/>
+          </a:ln>
+        </p:spPr>
+        <p:style>
+          <a:lnRef idx="1">
+            <a:schemeClr val="accent1"/>
+          </a:lnRef>
+          <a:fillRef idx="0">
+            <a:schemeClr val="accent1"/>
+          </a:fillRef>
+          <a:effectRef idx="0">
+            <a:schemeClr val="accent1"/>
+          </a:effectRef>
+          <a:fontRef idx="minor">
+            <a:schemeClr val="tx1"/>
+          </a:fontRef>
+        </p:style>
+      </p:cxnSp>
     </p:spTree>
     <p:extLst>
       <p:ext uri="{BB962C8B-B14F-4D97-AF65-F5344CB8AC3E}">

</xml_diff>